<commit_message>
Give proper name to presentations
</commit_message>
<xml_diff>
--- a/presentations/topic/topic.pptx
+++ b/presentations/topic/topic.pptx
@@ -207,7 +207,7 @@
           <a:p>
             <a:fld id="{C52CE617-4E55-4C88-8056-E4170CB3D5D9}" type="datetime1">
               <a:rPr lang="de-DE" smtClean="0"/>
-              <a:t>21.10.2019</a:t>
+              <a:t>17.11.2019</a:t>
             </a:fld>
             <a:endParaRPr lang="de-DE"/>
           </a:p>
@@ -373,7 +373,7 @@
           <a:p>
             <a:fld id="{A02228DC-C190-4EC9-BBDC-AC7F7FC0E1B2}" type="datetime1">
               <a:rPr lang="de-DE" smtClean="0"/>
-              <a:t>21.10.2019</a:t>
+              <a:t>17.11.2019</a:t>
             </a:fld>
             <a:endParaRPr lang="de-DE"/>
           </a:p>
@@ -733,7 +733,7 @@
           <a:p>
             <a:fld id="{EECBB28D-42E2-4786-9C01-EB16EE1D0F58}" type="datetime1">
               <a:rPr lang="de-DE" smtClean="0"/>
-              <a:t>21.10.2019</a:t>
+              <a:t>17.11.2019</a:t>
             </a:fld>
             <a:endParaRPr lang="de-DE"/>
           </a:p>
@@ -839,14 +839,14 @@
               <a:buChar char="-"/>
             </a:pPr>
             <a:r>
-              <a:rPr lang="en-US" dirty="0" smtClean="0"/>
+              <a:rPr lang="en-US" dirty="0"/>
               <a:t>Want</a:t>
             </a:r>
             <a:r>
-              <a:rPr lang="en-US" baseline="0" dirty="0" smtClean="0"/>
+              <a:rPr lang="en-US" baseline="0" dirty="0"/>
               <a:t> to estimate material properties from images of real world surfaces</a:t>
             </a:r>
-            <a:endParaRPr lang="en-US" dirty="0" smtClean="0"/>
+            <a:endParaRPr lang="en-US" dirty="0"/>
           </a:p>
           <a:p>
             <a:pPr marL="171450" indent="-171450">
@@ -854,11 +854,11 @@
               <a:buChar char="-"/>
             </a:pPr>
             <a:r>
-              <a:rPr lang="en-US" dirty="0" smtClean="0"/>
+              <a:rPr lang="en-US" dirty="0"/>
               <a:t>Material properties here</a:t>
             </a:r>
             <a:r>
-              <a:rPr lang="en-US" baseline="0" dirty="0" smtClean="0"/>
+              <a:rPr lang="en-US" baseline="0" dirty="0"/>
               <a:t> specifically reflection properties (not transmission)</a:t>
             </a:r>
           </a:p>
@@ -868,7 +868,7 @@
               <a:buChar char="-"/>
             </a:pPr>
             <a:r>
-              <a:rPr lang="en-US" baseline="0" dirty="0" smtClean="0"/>
+              <a:rPr lang="en-US" baseline="0" dirty="0"/>
               <a:t>I have one constraint for this task: I want to do this using a differentiable renderer at some point </a:t>
             </a:r>
           </a:p>
@@ -878,14 +878,14 @@
               <a:buNone/>
             </a:pPr>
             <a:r>
-              <a:rPr lang="en-US" baseline="0" dirty="0" smtClean="0"/>
+              <a:rPr lang="en-US" baseline="0" dirty="0"/>
               <a:t>--&gt; is a renderer which allows differentiation of the output image with respect to the rendering parameters like e.g. camera position</a:t>
             </a:r>
-            <a:endParaRPr lang="en-US" dirty="0" smtClean="0"/>
-          </a:p>
-          <a:p>
-            <a:r>
-              <a:rPr lang="en-US" dirty="0" smtClean="0"/>
+            <a:endParaRPr lang="en-US" dirty="0"/>
+          </a:p>
+          <a:p>
+            <a:r>
+              <a:rPr lang="en-US" dirty="0"/>
               <a:t>- SVBRDF = spatially varying reflectance distribution function</a:t>
             </a:r>
             <a:endParaRPr lang="de-DE" dirty="0"/>
@@ -928,7 +928,7 @@
           <a:p>
             <a:fld id="{A02228DC-C190-4EC9-BBDC-AC7F7FC0E1B2}" type="datetime1">
               <a:rPr lang="de-DE" smtClean="0"/>
-              <a:t>21.10.2019</a:t>
+              <a:t>17.11.2019</a:t>
             </a:fld>
             <a:endParaRPr lang="de-DE"/>
           </a:p>
@@ -1034,14 +1034,14 @@
           <a:lstStyle/>
           <a:p>
             <a:r>
-              <a:rPr lang="en-US" dirty="0" smtClean="0"/>
+              <a:rPr lang="en-US" dirty="0"/>
               <a:t>-</a:t>
             </a:r>
             <a:r>
-              <a:rPr lang="en-US" baseline="0" dirty="0" smtClean="0"/>
+              <a:rPr lang="en-US" baseline="0" dirty="0"/>
               <a:t> (Want to touch on why even care about surface appearance of objects (why differentiable renderer is more clear after the “how”))</a:t>
             </a:r>
-            <a:endParaRPr lang="en-US" dirty="0" smtClean="0"/>
+            <a:endParaRPr lang="en-US" dirty="0"/>
           </a:p>
           <a:p>
             <a:pPr marL="0" indent="0">
@@ -1049,15 +1049,15 @@
               <a:buNone/>
             </a:pPr>
             <a:r>
-              <a:rPr lang="en-US" dirty="0" smtClean="0"/>
+              <a:rPr lang="en-US" dirty="0"/>
               <a:t>- Image-based material estimation is important if we want to have 3d reconstruction</a:t>
             </a:r>
             <a:r>
-              <a:rPr lang="en-US" baseline="0" dirty="0" smtClean="0"/>
+              <a:rPr lang="en-US" baseline="0" dirty="0"/>
               <a:t> methods which not only recover the geometry but also the appearance</a:t>
             </a:r>
             <a:r>
-              <a:rPr lang="en-US" dirty="0" smtClean="0"/>
+              <a:rPr lang="en-US" dirty="0"/>
               <a:t> of real world objects </a:t>
             </a:r>
           </a:p>
@@ -1067,18 +1067,18 @@
               <a:buNone/>
             </a:pPr>
             <a:r>
-              <a:rPr lang="en-US" baseline="0" dirty="0" smtClean="0"/>
+              <a:rPr lang="en-US" baseline="0" dirty="0"/>
               <a:t>--- reconstructing </a:t>
             </a:r>
             <a:r>
-              <a:rPr lang="en-US" dirty="0" smtClean="0"/>
+              <a:rPr lang="en-US" dirty="0"/>
               <a:t>geometry from images is already</a:t>
             </a:r>
             <a:r>
-              <a:rPr lang="en-US" baseline="0" dirty="0" smtClean="0"/>
+              <a:rPr lang="en-US" baseline="0" dirty="0"/>
               <a:t> very advanced, material not so much</a:t>
             </a:r>
-            <a:endParaRPr lang="en-US" dirty="0" smtClean="0"/>
+            <a:endParaRPr lang="en-US" dirty="0"/>
           </a:p>
           <a:p>
             <a:pPr marL="171450" indent="-171450">
@@ -1086,15 +1086,15 @@
               <a:buChar char="-"/>
             </a:pPr>
             <a:r>
-              <a:rPr lang="en-US" dirty="0" smtClean="0"/>
+              <a:rPr lang="en-US" dirty="0"/>
               <a:t>Biggest use-case of such methods is probably</a:t>
             </a:r>
             <a:r>
-              <a:rPr lang="en-US" baseline="0" dirty="0" smtClean="0"/>
+              <a:rPr lang="en-US" baseline="0" dirty="0"/>
               <a:t> the creation </a:t>
             </a:r>
             <a:r>
-              <a:rPr lang="en-US" dirty="0" smtClean="0"/>
+              <a:rPr lang="en-US" dirty="0"/>
               <a:t>photorealistic assets</a:t>
             </a:r>
           </a:p>
@@ -1104,7 +1104,7 @@
               <a:buChar char="-"/>
             </a:pPr>
             <a:r>
-              <a:rPr lang="en-US" dirty="0" smtClean="0"/>
+              <a:rPr lang="en-US" dirty="0"/>
               <a:t>-- for example for integration in virtual environments like games, movies</a:t>
             </a:r>
           </a:p>
@@ -1114,27 +1114,27 @@
               <a:buChar char="-"/>
             </a:pPr>
             <a:r>
-              <a:rPr lang="en-US" dirty="0" smtClean="0"/>
+              <a:rPr lang="en-US" dirty="0"/>
               <a:t>--</a:t>
             </a:r>
             <a:r>
-              <a:rPr lang="en-US" baseline="0" dirty="0" smtClean="0"/>
+              <a:rPr lang="en-US" baseline="0" dirty="0"/>
               <a:t> </a:t>
             </a:r>
             <a:r>
-              <a:rPr lang="en-US" dirty="0" smtClean="0"/>
+              <a:rPr lang="en-US" dirty="0"/>
               <a:t>cultural heritage (imagine</a:t>
             </a:r>
             <a:r>
-              <a:rPr lang="en-US" baseline="0" dirty="0" smtClean="0"/>
+              <a:rPr lang="en-US" baseline="0" dirty="0"/>
               <a:t> </a:t>
             </a:r>
             <a:r>
-              <a:rPr lang="en-US" dirty="0" smtClean="0"/>
+              <a:rPr lang="en-US" dirty="0"/>
               <a:t>ancient</a:t>
             </a:r>
             <a:r>
-              <a:rPr lang="en-US" baseline="0" dirty="0" smtClean="0"/>
+              <a:rPr lang="en-US" baseline="0" dirty="0"/>
               <a:t> artifacts being scanned and preserved)</a:t>
             </a:r>
           </a:p>
@@ -1144,10 +1144,10 @@
               <a:buChar char="-"/>
             </a:pPr>
             <a:r>
-              <a:rPr lang="en-US" baseline="0" dirty="0" smtClean="0"/>
+              <a:rPr lang="en-US" baseline="0" dirty="0"/>
               <a:t>Others</a:t>
             </a:r>
-            <a:endParaRPr lang="en-US" dirty="0" smtClean="0"/>
+            <a:endParaRPr lang="en-US" dirty="0"/>
           </a:p>
           <a:p>
             <a:pPr marL="0" indent="0">
@@ -1155,170 +1155,170 @@
               <a:buNone/>
             </a:pPr>
             <a:r>
-              <a:rPr lang="de-DE" dirty="0" smtClean="0"/>
+              <a:rPr lang="de-DE" dirty="0"/>
               <a:t>- </a:t>
             </a:r>
             <a:r>
-              <a:rPr lang="de-DE" dirty="0" err="1" smtClean="0"/>
+              <a:rPr lang="de-DE" dirty="0" err="1"/>
               <a:t>Another</a:t>
             </a:r>
             <a:r>
-              <a:rPr lang="de-DE" dirty="0" smtClean="0"/>
+              <a:rPr lang="de-DE" dirty="0"/>
               <a:t> </a:t>
             </a:r>
             <a:r>
-              <a:rPr lang="de-DE" dirty="0" err="1" smtClean="0"/>
+              <a:rPr lang="de-DE" dirty="0" err="1"/>
               <a:t>use-case</a:t>
             </a:r>
             <a:r>
-              <a:rPr lang="de-DE" dirty="0" smtClean="0"/>
+              <a:rPr lang="de-DE" dirty="0"/>
               <a:t> </a:t>
             </a:r>
             <a:r>
-              <a:rPr lang="de-DE" dirty="0" err="1" smtClean="0"/>
+              <a:rPr lang="de-DE" dirty="0" err="1"/>
               <a:t>could</a:t>
             </a:r>
             <a:r>
-              <a:rPr lang="de-DE" dirty="0" smtClean="0"/>
+              <a:rPr lang="de-DE" dirty="0"/>
               <a:t> </a:t>
             </a:r>
             <a:r>
-              <a:rPr lang="de-DE" dirty="0" err="1" smtClean="0"/>
+              <a:rPr lang="de-DE" dirty="0" err="1"/>
               <a:t>be</a:t>
             </a:r>
             <a:r>
-              <a:rPr lang="de-DE" dirty="0" smtClean="0"/>
+              <a:rPr lang="de-DE" dirty="0"/>
               <a:t> </a:t>
             </a:r>
             <a:r>
-              <a:rPr lang="de-DE" dirty="0" err="1" smtClean="0"/>
+              <a:rPr lang="de-DE" dirty="0" err="1"/>
               <a:t>re-crafting</a:t>
             </a:r>
             <a:r>
-              <a:rPr lang="de-DE" dirty="0" smtClean="0"/>
+              <a:rPr lang="de-DE" dirty="0"/>
               <a:t> </a:t>
             </a:r>
             <a:r>
-              <a:rPr lang="de-DE" dirty="0" err="1" smtClean="0"/>
+              <a:rPr lang="de-DE" dirty="0" err="1"/>
               <a:t>of</a:t>
             </a:r>
             <a:r>
-              <a:rPr lang="de-DE" baseline="0" dirty="0" smtClean="0"/>
+              <a:rPr lang="de-DE" baseline="0" dirty="0"/>
               <a:t> </a:t>
             </a:r>
             <a:r>
-              <a:rPr lang="de-DE" dirty="0" smtClean="0"/>
+              <a:rPr lang="de-DE" dirty="0"/>
               <a:t>real </a:t>
             </a:r>
             <a:r>
-              <a:rPr lang="de-DE" dirty="0" err="1" smtClean="0"/>
+              <a:rPr lang="de-DE" dirty="0" err="1"/>
               <a:t>world</a:t>
             </a:r>
             <a:r>
-              <a:rPr lang="de-DE" dirty="0" smtClean="0"/>
+              <a:rPr lang="de-DE" dirty="0"/>
               <a:t> </a:t>
             </a:r>
             <a:r>
-              <a:rPr lang="de-DE" dirty="0" err="1" smtClean="0"/>
+              <a:rPr lang="de-DE" dirty="0" err="1"/>
               <a:t>objects</a:t>
             </a:r>
             <a:r>
-              <a:rPr lang="de-DE" dirty="0" smtClean="0"/>
+              <a:rPr lang="de-DE" dirty="0"/>
               <a:t> </a:t>
             </a:r>
             <a:r>
-              <a:rPr lang="de-DE" dirty="0" err="1" smtClean="0"/>
+              <a:rPr lang="de-DE" dirty="0" err="1"/>
               <a:t>with</a:t>
             </a:r>
             <a:r>
-              <a:rPr lang="de-DE" dirty="0" smtClean="0"/>
+              <a:rPr lang="de-DE" dirty="0"/>
               <a:t> </a:t>
             </a:r>
             <a:r>
-              <a:rPr lang="de-DE" dirty="0" err="1" smtClean="0"/>
+              <a:rPr lang="de-DE" dirty="0" err="1"/>
               <a:t>the</a:t>
             </a:r>
             <a:r>
-              <a:rPr lang="de-DE" dirty="0" smtClean="0"/>
+              <a:rPr lang="de-DE" dirty="0"/>
               <a:t> </a:t>
             </a:r>
             <a:r>
-              <a:rPr lang="de-DE" dirty="0" err="1" smtClean="0"/>
+              <a:rPr lang="de-DE" dirty="0" err="1"/>
               <a:t>corresponding</a:t>
             </a:r>
             <a:r>
-              <a:rPr lang="de-DE" dirty="0" smtClean="0"/>
+              <a:rPr lang="de-DE" dirty="0"/>
               <a:t> </a:t>
             </a:r>
             <a:r>
-              <a:rPr lang="de-DE" dirty="0" err="1" smtClean="0"/>
+              <a:rPr lang="de-DE" dirty="0" err="1"/>
               <a:t>materials</a:t>
             </a:r>
             <a:r>
-              <a:rPr lang="de-DE" dirty="0" smtClean="0"/>
+              <a:rPr lang="de-DE" dirty="0"/>
               <a:t> (e.g. </a:t>
             </a:r>
             <a:r>
-              <a:rPr lang="de-DE" dirty="0" err="1" smtClean="0"/>
+              <a:rPr lang="de-DE" dirty="0" err="1"/>
               <a:t>multi</a:t>
             </a:r>
             <a:r>
-              <a:rPr lang="de-DE" dirty="0" smtClean="0"/>
+              <a:rPr lang="de-DE" dirty="0"/>
               <a:t> material 3d </a:t>
             </a:r>
             <a:r>
-              <a:rPr lang="de-DE" dirty="0" err="1" smtClean="0"/>
+              <a:rPr lang="de-DE" dirty="0" err="1"/>
               <a:t>printers</a:t>
             </a:r>
             <a:r>
-              <a:rPr lang="de-DE" dirty="0" smtClean="0"/>
+              <a:rPr lang="de-DE" dirty="0"/>
               <a:t>) --- Not 100% </a:t>
             </a:r>
             <a:r>
-              <a:rPr lang="de-DE" dirty="0" err="1" smtClean="0"/>
+              <a:rPr lang="de-DE" dirty="0" err="1"/>
               <a:t>sure</a:t>
             </a:r>
             <a:r>
-              <a:rPr lang="de-DE" dirty="0" smtClean="0"/>
+              <a:rPr lang="de-DE" dirty="0"/>
               <a:t> </a:t>
             </a:r>
             <a:r>
-              <a:rPr lang="de-DE" dirty="0" err="1" smtClean="0"/>
+              <a:rPr lang="de-DE" dirty="0" err="1"/>
               <a:t>how</a:t>
             </a:r>
             <a:r>
-              <a:rPr lang="de-DE" dirty="0" smtClean="0"/>
+              <a:rPr lang="de-DE" dirty="0"/>
               <a:t> </a:t>
             </a:r>
             <a:r>
-              <a:rPr lang="de-DE" dirty="0" err="1" smtClean="0"/>
+              <a:rPr lang="de-DE" dirty="0" err="1"/>
               <a:t>advanced</a:t>
             </a:r>
             <a:r>
-              <a:rPr lang="de-DE" baseline="0" dirty="0" smtClean="0"/>
+              <a:rPr lang="de-DE" baseline="0" dirty="0"/>
               <a:t> </a:t>
             </a:r>
             <a:r>
-              <a:rPr lang="de-DE" baseline="0" dirty="0" err="1" smtClean="0"/>
+              <a:rPr lang="de-DE" baseline="0" dirty="0" err="1"/>
               <a:t>this</a:t>
             </a:r>
             <a:r>
-              <a:rPr lang="de-DE" baseline="0" dirty="0" smtClean="0"/>
+              <a:rPr lang="de-DE" baseline="0" dirty="0"/>
               <a:t> </a:t>
             </a:r>
             <a:r>
-              <a:rPr lang="de-DE" baseline="0" dirty="0" err="1" smtClean="0"/>
+              <a:rPr lang="de-DE" baseline="0" dirty="0" err="1"/>
               <a:t>field</a:t>
             </a:r>
             <a:r>
-              <a:rPr lang="de-DE" baseline="0" dirty="0" smtClean="0"/>
+              <a:rPr lang="de-DE" baseline="0" dirty="0"/>
               <a:t> </a:t>
             </a:r>
             <a:r>
-              <a:rPr lang="de-DE" baseline="0" dirty="0" err="1" smtClean="0"/>
+              <a:rPr lang="de-DE" baseline="0" dirty="0" err="1"/>
               <a:t>is</a:t>
             </a:r>
-            <a:endParaRPr lang="de-DE" dirty="0" smtClean="0"/>
+            <a:endParaRPr lang="de-DE" dirty="0"/>
           </a:p>
         </p:txBody>
       </p:sp>
@@ -1358,7 +1358,7 @@
           <a:p>
             <a:fld id="{A02228DC-C190-4EC9-BBDC-AC7F7FC0E1B2}" type="datetime1">
               <a:rPr lang="de-DE" smtClean="0"/>
-              <a:t>21.10.2019</a:t>
+              <a:t>17.11.2019</a:t>
             </a:fld>
             <a:endParaRPr lang="de-DE"/>
           </a:p>
@@ -1468,15 +1468,15 @@
               <a:buChar char="-"/>
             </a:pPr>
             <a:r>
-              <a:rPr lang="en-US" baseline="0" dirty="0" smtClean="0"/>
+              <a:rPr lang="en-US" baseline="0" dirty="0"/>
               <a:t>Obviously I’m not going to building my own pipeline from scratch but </a:t>
             </a:r>
             <a:r>
-              <a:rPr lang="en-US" dirty="0" smtClean="0"/>
+              <a:rPr lang="en-US" dirty="0"/>
               <a:t>use an</a:t>
             </a:r>
             <a:r>
-              <a:rPr lang="en-US" baseline="0" dirty="0" smtClean="0"/>
+              <a:rPr lang="en-US" baseline="0" dirty="0"/>
               <a:t> existing one</a:t>
             </a:r>
           </a:p>
@@ -1486,15 +1486,15 @@
               <a:buChar char="-"/>
             </a:pPr>
             <a:r>
-              <a:rPr lang="en-US" baseline="0" dirty="0" smtClean="0"/>
+              <a:rPr lang="en-US" baseline="0" dirty="0"/>
               <a:t>Specifically I will use the paper </a:t>
             </a:r>
             <a:r>
-              <a:rPr lang="en-DE" baseline="0" dirty="0" smtClean="0"/>
+              <a:rPr lang="en-DE" baseline="0" dirty="0"/>
               <a:t>…</a:t>
             </a:r>
             <a:r>
-              <a:rPr lang="en-US" baseline="0" dirty="0" smtClean="0"/>
+              <a:rPr lang="en-US" baseline="0" dirty="0"/>
               <a:t> as base </a:t>
             </a:r>
           </a:p>
@@ -1504,7 +1504,7 @@
               <a:buChar char="-"/>
             </a:pPr>
             <a:r>
-              <a:rPr lang="en-US" baseline="0" dirty="0" smtClean="0"/>
+              <a:rPr lang="en-US" baseline="0" dirty="0"/>
               <a:t>From a single flash image of a flat surface they output material reflection properties of this surface</a:t>
             </a:r>
           </a:p>
@@ -1527,7 +1527,7 @@
               <a:defRPr/>
             </a:pPr>
             <a:r>
-              <a:rPr lang="en-US" baseline="0" dirty="0" smtClean="0"/>
+              <a:rPr lang="en-US" baseline="0" dirty="0"/>
               <a:t>How exactly these properties are modeled will follow in the technical presentation</a:t>
             </a:r>
           </a:p>
@@ -1537,10 +1537,10 @@
               <a:buChar char="-"/>
             </a:pPr>
             <a:r>
-              <a:rPr lang="en-US" baseline="0" dirty="0" smtClean="0"/>
+              <a:rPr lang="en-US" baseline="0" dirty="0"/>
               <a:t>They use a convolutional network that is trained with the help of a very basic differentiable renderer (they use some kind of rendering loss as training objective)</a:t>
             </a:r>
-            <a:endParaRPr lang="en-US" dirty="0" smtClean="0"/>
+            <a:endParaRPr lang="en-US" dirty="0"/>
           </a:p>
           <a:p>
             <a:pPr marL="171450" indent="-171450">
@@ -1548,22 +1548,22 @@
               <a:buChar char="-"/>
             </a:pPr>
             <a:r>
-              <a:rPr lang="en-US" dirty="0" smtClean="0"/>
+              <a:rPr lang="en-US" dirty="0"/>
               <a:t>Current plan is integrating the Mitsuba 2 renderer</a:t>
             </a:r>
             <a:r>
-              <a:rPr lang="en-US" baseline="0" dirty="0" smtClean="0"/>
+              <a:rPr lang="en-US" baseline="0" dirty="0"/>
               <a:t> into their pipeline, so use a “real” renderer not just some </a:t>
             </a:r>
             <a:r>
-              <a:rPr lang="en-US" baseline="0" dirty="0" err="1" smtClean="0"/>
+              <a:rPr lang="en-US" baseline="0" dirty="0" err="1"/>
               <a:t>tensorflow</a:t>
             </a:r>
             <a:r>
-              <a:rPr lang="en-US" baseline="0" dirty="0" smtClean="0"/>
+              <a:rPr lang="en-US" baseline="0" dirty="0"/>
               <a:t> layers</a:t>
             </a:r>
-            <a:endParaRPr lang="de-DE" baseline="0" dirty="0" smtClean="0"/>
+            <a:endParaRPr lang="de-DE" baseline="0" dirty="0"/>
           </a:p>
           <a:p>
             <a:pPr marL="171450" indent="-171450">
@@ -1571,10 +1571,10 @@
               <a:buChar char="-"/>
             </a:pPr>
             <a:r>
-              <a:rPr lang="en-US" baseline="0" dirty="0" smtClean="0"/>
+              <a:rPr lang="en-US" baseline="0" dirty="0"/>
               <a:t>“Real” renderer would lay the basis for extending the idea from flat surface and reflectance properties to arbitrarily shaped scenes (where global illumination is important to consider) and also transmittance properties needed for e. g. translucent materials </a:t>
             </a:r>
-            <a:endParaRPr lang="en-US" dirty="0" smtClean="0"/>
+            <a:endParaRPr lang="en-US" dirty="0"/>
           </a:p>
         </p:txBody>
       </p:sp>
@@ -1614,7 +1614,7 @@
           <a:p>
             <a:fld id="{A02228DC-C190-4EC9-BBDC-AC7F7FC0E1B2}" type="datetime1">
               <a:rPr lang="de-DE" smtClean="0"/>
-              <a:t>21.10.2019</a:t>
+              <a:t>17.11.2019</a:t>
             </a:fld>
             <a:endParaRPr lang="de-DE"/>
           </a:p>
@@ -4998,17 +4998,9 @@
             <a:br>
               <a:rPr lang="de-DE" dirty="0"/>
             </a:br>
-            <a:r>
-              <a:rPr lang="de-DE" dirty="0"/>
-              <a:t/>
-            </a:r>
             <a:br>
               <a:rPr lang="de-DE" dirty="0"/>
             </a:br>
-            <a:r>
-              <a:rPr lang="de-DE" dirty="0"/>
-              <a:t/>
-            </a:r>
             <a:br>
               <a:rPr lang="de-DE" dirty="0"/>
             </a:br>
@@ -5225,13 +5217,6 @@
   <p:clrMapOvr>
     <a:masterClrMapping/>
   </p:clrMapOvr>
-  <p:timing>
-    <p:tnLst>
-      <p:par>
-        <p:cTn id="1" dur="indefinite" restart="never" nodeType="tmRoot"/>
-      </p:par>
-    </p:tnLst>
-  </p:timing>
 </p:sld>
 </file>
 
@@ -5382,18 +5367,18 @@
           <a:lstStyle/>
           <a:p>
             <a:r>
-              <a:rPr lang="en-US" dirty="0" smtClean="0"/>
+              <a:rPr lang="en-US" dirty="0"/>
               <a:t>Estimate surface material properties from images</a:t>
             </a:r>
           </a:p>
           <a:p>
             <a:r>
-              <a:rPr lang="en-US" dirty="0" smtClean="0"/>
+              <a:rPr lang="en-US" dirty="0"/>
               <a:t>Constraint: Use a physically-based differentiable renderer</a:t>
             </a:r>
           </a:p>
           <a:p>
-            <a:endParaRPr lang="en-US" dirty="0" smtClean="0"/>
+            <a:endParaRPr lang="en-US" dirty="0"/>
           </a:p>
           <a:p>
             <a:endParaRPr lang="de-DE" dirty="0"/>
@@ -5440,13 +5425,6 @@
   <p:clrMapOvr>
     <a:masterClrMapping/>
   </p:clrMapOvr>
-  <p:timing>
-    <p:tnLst>
-      <p:par>
-        <p:cTn id="1" dur="indefinite" restart="never" nodeType="tmRoot"/>
-      </p:par>
-    </p:tnLst>
-  </p:timing>
 </p:sld>
 </file>
 
@@ -5524,66 +5502,54 @@
           <a:p>
             <a:r>
               <a:rPr lang="en-US" dirty="0"/>
-              <a:t>Gear towards </a:t>
-            </a:r>
-            <a:r>
-              <a:rPr lang="en-US" dirty="0" smtClean="0"/>
-              <a:t>holistic 3D reconstruction (geometry + material)</a:t>
-            </a:r>
-          </a:p>
-          <a:p>
-            <a:r>
-              <a:rPr lang="en-US" dirty="0" smtClean="0"/>
-              <a:t>Photorealistic </a:t>
-            </a:r>
+              <a:t>Gear towards holistic 3D reconstruction (geometry + material)</a:t>
+            </a:r>
+          </a:p>
+          <a:p>
             <a:r>
               <a:rPr lang="en-US" dirty="0"/>
-              <a:t>assets </a:t>
-            </a:r>
-            <a:r>
-              <a:rPr lang="en-US" dirty="0" smtClean="0"/>
-              <a:t>for </a:t>
+              <a:t>Photorealistic assets for </a:t>
             </a:r>
           </a:p>
           <a:p>
             <a:pPr lvl="1"/>
             <a:r>
-              <a:rPr lang="en-US" dirty="0" smtClean="0"/>
+              <a:rPr lang="en-US" dirty="0"/>
               <a:t>Games</a:t>
             </a:r>
           </a:p>
           <a:p>
             <a:pPr lvl="1"/>
             <a:r>
-              <a:rPr lang="en-US" dirty="0" smtClean="0"/>
+              <a:rPr lang="en-US" dirty="0"/>
               <a:t>Movies</a:t>
             </a:r>
           </a:p>
           <a:p>
             <a:pPr lvl="1"/>
             <a:r>
-              <a:rPr lang="en-US" dirty="0" smtClean="0"/>
+              <a:rPr lang="en-US" dirty="0"/>
               <a:t>Cultural heritage</a:t>
             </a:r>
           </a:p>
           <a:p>
             <a:pPr lvl="1"/>
             <a:r>
-              <a:rPr lang="en-DE" dirty="0" smtClean="0"/>
+              <a:rPr lang="en-DE" dirty="0"/>
               <a:t>…</a:t>
             </a:r>
             <a:endParaRPr lang="en-US" dirty="0"/>
           </a:p>
           <a:p>
             <a:r>
-              <a:rPr lang="de-DE" dirty="0" smtClean="0"/>
+              <a:rPr lang="de-DE" dirty="0"/>
               <a:t>Multi material 3D </a:t>
             </a:r>
             <a:r>
-              <a:rPr lang="de-DE" dirty="0" err="1" smtClean="0"/>
+              <a:rPr lang="de-DE" dirty="0" err="1"/>
               <a:t>printing</a:t>
             </a:r>
-            <a:endParaRPr lang="de-DE" dirty="0" smtClean="0"/>
+            <a:endParaRPr lang="de-DE" dirty="0"/>
           </a:p>
         </p:txBody>
       </p:sp>
@@ -5712,13 +5678,6 @@
   <p:clrMapOvr>
     <a:masterClrMapping/>
   </p:clrMapOvr>
-  <p:timing>
-    <p:tnLst>
-      <p:par>
-        <p:cTn id="1" dur="indefinite" restart="never" nodeType="tmRoot"/>
-      </p:par>
-    </p:tnLst>
-  </p:timing>
 </p:sld>
 </file>
 
@@ -5762,11 +5721,7 @@
           <a:p>
             <a:r>
               <a:rPr lang="en-US" dirty="0"/>
-              <a:t>How</a:t>
-            </a:r>
-            <a:r>
-              <a:rPr lang="en-US" dirty="0" smtClean="0"/>
-              <a:t>?</a:t>
+              <a:t>How?</a:t>
             </a:r>
             <a:endParaRPr lang="de-DE" dirty="0"/>
           </a:p>
@@ -5796,16 +5751,8 @@
           <a:lstStyle/>
           <a:p>
             <a:r>
-              <a:rPr lang="en-US" dirty="0" smtClean="0"/>
-              <a:t>Single-Image </a:t>
-            </a:r>
-            <a:r>
               <a:rPr lang="en-US" dirty="0"/>
-              <a:t>SVBRDF Capture with a Rendering-Aware Deep </a:t>
-            </a:r>
-            <a:r>
-              <a:rPr lang="en-US" dirty="0" smtClean="0"/>
-              <a:t>Network (</a:t>
+              <a:t>Single-Image SVBRDF Capture with a Rendering-Aware Deep Network (</a:t>
             </a:r>
             <a:r>
               <a:rPr lang="en-US" dirty="0" err="1"/>
@@ -5813,56 +5760,42 @@
             </a:r>
             <a:r>
               <a:rPr lang="en-US" dirty="0"/>
-              <a:t> et </a:t>
-            </a:r>
-            <a:r>
-              <a:rPr lang="en-US" dirty="0" smtClean="0"/>
-              <a:t>al., 2018)</a:t>
+              <a:t> et al., 2018)</a:t>
             </a:r>
           </a:p>
           <a:p>
             <a:pPr lvl="1"/>
             <a:r>
-              <a:rPr lang="en-US" dirty="0" smtClean="0"/>
+              <a:rPr lang="en-US" dirty="0"/>
               <a:t>Method based on machine learning and differentiable rendering</a:t>
             </a:r>
           </a:p>
           <a:p>
             <a:pPr lvl="1"/>
             <a:r>
-              <a:rPr lang="en-US" dirty="0" smtClean="0"/>
+              <a:rPr lang="en-US" dirty="0"/>
               <a:t>Dataset of 200000 (artificial) material samples</a:t>
             </a:r>
           </a:p>
           <a:p>
             <a:r>
-              <a:rPr lang="en-US" dirty="0" smtClean="0"/>
+              <a:rPr lang="en-US" dirty="0"/>
               <a:t>Integration of Mitsuba 2 (</a:t>
             </a:r>
             <a:r>
-              <a:rPr lang="en-US" dirty="0" err="1" smtClean="0"/>
+              <a:rPr lang="en-US" dirty="0" err="1"/>
               <a:t>Nimier</a:t>
             </a:r>
             <a:r>
-              <a:rPr lang="en-US" dirty="0" smtClean="0"/>
+              <a:rPr lang="en-US" dirty="0"/>
               <a:t>-David et al., 2019)</a:t>
             </a:r>
-            <a:endParaRPr lang="en-US" dirty="0"/>
-          </a:p>
-          <a:p>
-            <a:r>
-              <a:rPr lang="en-US" dirty="0" smtClean="0"/>
-              <a:t>“</a:t>
-            </a:r>
+          </a:p>
+          <a:p>
             <a:r>
               <a:rPr lang="en-US" dirty="0"/>
-              <a:t>Real” renderer enables </a:t>
-            </a:r>
-            <a:r>
-              <a:rPr lang="en-US" dirty="0" smtClean="0"/>
-              <a:t>simulation of</a:t>
-            </a:r>
-            <a:endParaRPr lang="en-US" dirty="0"/>
+              <a:t>“Real” renderer enables simulation of</a:t>
+            </a:r>
           </a:p>
           <a:p>
             <a:pPr lvl="1"/>
@@ -5976,13 +5909,6 @@
   <p:clrMapOvr>
     <a:masterClrMapping/>
   </p:clrMapOvr>
-  <p:timing>
-    <p:tnLst>
-      <p:par>
-        <p:cTn id="1" dur="indefinite" restart="never" nodeType="tmRoot"/>
-      </p:par>
-    </p:tnLst>
-  </p:timing>
 </p:sld>
 </file>
 
@@ -6025,7 +5951,7 @@
           <a:lstStyle/>
           <a:p>
             <a:r>
-              <a:rPr lang="en-US" dirty="0" smtClean="0"/>
+              <a:rPr lang="en-US" dirty="0"/>
               <a:t>Schedule</a:t>
             </a:r>
             <a:endParaRPr lang="de-DE" dirty="0"/>
@@ -6060,7 +5986,7 @@
               <a:buAutoNum type="arabicPeriod"/>
             </a:pPr>
             <a:r>
-              <a:rPr lang="en-US" dirty="0" smtClean="0"/>
+              <a:rPr lang="en-US" dirty="0"/>
               <a:t>Download database</a:t>
             </a:r>
           </a:p>
@@ -6070,24 +5996,23 @@
               <a:buAutoNum type="arabicPeriod"/>
             </a:pPr>
             <a:r>
-              <a:rPr lang="en-US" dirty="0" smtClean="0"/>
+              <a:rPr lang="en-US" dirty="0"/>
               <a:t>Acquire testing and training code for the network</a:t>
             </a:r>
           </a:p>
           <a:p>
             <a:pPr lvl="1"/>
             <a:r>
-              <a:rPr lang="en-US" dirty="0" smtClean="0"/>
+              <a:rPr lang="en-US" dirty="0"/>
               <a:t>Contact authors for training code</a:t>
             </a:r>
           </a:p>
           <a:p>
             <a:pPr lvl="1"/>
             <a:r>
-              <a:rPr lang="en-US" dirty="0" smtClean="0"/>
+              <a:rPr lang="en-US" dirty="0"/>
               <a:t>Fallback: Re-implementation</a:t>
             </a:r>
-            <a:endParaRPr lang="en-US" dirty="0"/>
           </a:p>
           <a:p>
             <a:pPr marL="514350" indent="-514350">
@@ -6095,21 +6020,21 @@
               <a:buAutoNum type="arabicPeriod"/>
             </a:pPr>
             <a:r>
-              <a:rPr lang="en-US" dirty="0" smtClean="0"/>
+              <a:rPr lang="en-US" dirty="0"/>
               <a:t>Acquire code for Mitsuba 2</a:t>
             </a:r>
           </a:p>
           <a:p>
             <a:pPr lvl="1"/>
             <a:r>
-              <a:rPr lang="en-US" dirty="0" smtClean="0"/>
+              <a:rPr lang="en-US" dirty="0"/>
               <a:t>Not yet officially released</a:t>
             </a:r>
           </a:p>
           <a:p>
             <a:pPr lvl="1"/>
             <a:r>
-              <a:rPr lang="en-US" dirty="0" smtClean="0"/>
+              <a:rPr lang="en-US" dirty="0"/>
               <a:t>Fallback: Use other renderer like render (Li et al., 2018)</a:t>
             </a:r>
           </a:p>
@@ -6119,7 +6044,7 @@
               <a:buAutoNum type="arabicPeriod"/>
             </a:pPr>
             <a:r>
-              <a:rPr lang="en-GB" dirty="0" smtClean="0"/>
+              <a:rPr lang="en-GB" dirty="0"/>
               <a:t>Get familiar with papers, source code and data</a:t>
             </a:r>
           </a:p>
@@ -6129,7 +6054,7 @@
               <a:buAutoNum type="arabicPeriod"/>
             </a:pPr>
             <a:r>
-              <a:rPr lang="en-GB" dirty="0" smtClean="0"/>
+              <a:rPr lang="en-GB" dirty="0"/>
               <a:t>Replace rendering layers of the network with Mitsuba 2</a:t>
             </a:r>
           </a:p>
@@ -6139,10 +6064,10 @@
               <a:buAutoNum type="arabicPeriod"/>
             </a:pPr>
             <a:r>
-              <a:rPr lang="en-GB" dirty="0" smtClean="0"/>
+              <a:rPr lang="en-GB" dirty="0"/>
               <a:t>Evaluation (compare with unmodified method)</a:t>
             </a:r>
-            <a:endParaRPr lang="en-US" dirty="0" smtClean="0"/>
+            <a:endParaRPr lang="en-US" dirty="0"/>
           </a:p>
           <a:p>
             <a:pPr marL="457200" lvl="1" indent="0">
@@ -6247,13 +6172,6 @@
   <p:clrMapOvr>
     <a:masterClrMapping/>
   </p:clrMapOvr>
-  <p:timing>
-    <p:tnLst>
-      <p:par>
-        <p:cTn id="1" dur="indefinite" restart="never" nodeType="tmRoot"/>
-      </p:par>
-    </p:tnLst>
-  </p:timing>
 </p:sld>
 </file>
 

</xml_diff>